<commit_message>
commit goroutine and reflect
</commit_message>
<xml_diff>
--- a/繪圖區.pptx
+++ b/繪圖區.pptx
@@ -11,6 +11,7 @@
     <p:sldId id="259" r:id="rId5"/>
     <p:sldId id="260" r:id="rId6"/>
     <p:sldId id="261" r:id="rId7"/>
+    <p:sldId id="262" r:id="rId8"/>
   </p:sldIdLst>
   <p:sldSz cx="12192000" cy="6858000"/>
   <p:notesSz cx="6858000" cy="9144000"/>
@@ -260,7 +261,7 @@
           <a:p>
             <a:fld id="{177A7A6B-857B-42A0-831B-252DEB20B34E}" type="datetimeFigureOut">
               <a:rPr lang="zh-TW" altLang="en-US" smtClean="0"/>
-              <a:t>2021/7/3</a:t>
+              <a:t>2021/7/5</a:t>
             </a:fld>
             <a:endParaRPr lang="zh-TW" altLang="en-US"/>
           </a:p>
@@ -430,7 +431,7 @@
           <a:p>
             <a:fld id="{177A7A6B-857B-42A0-831B-252DEB20B34E}" type="datetimeFigureOut">
               <a:rPr lang="zh-TW" altLang="en-US" smtClean="0"/>
-              <a:t>2021/7/3</a:t>
+              <a:t>2021/7/5</a:t>
             </a:fld>
             <a:endParaRPr lang="zh-TW" altLang="en-US"/>
           </a:p>
@@ -610,7 +611,7 @@
           <a:p>
             <a:fld id="{177A7A6B-857B-42A0-831B-252DEB20B34E}" type="datetimeFigureOut">
               <a:rPr lang="zh-TW" altLang="en-US" smtClean="0"/>
-              <a:t>2021/7/3</a:t>
+              <a:t>2021/7/5</a:t>
             </a:fld>
             <a:endParaRPr lang="zh-TW" altLang="en-US"/>
           </a:p>
@@ -780,7 +781,7 @@
           <a:p>
             <a:fld id="{177A7A6B-857B-42A0-831B-252DEB20B34E}" type="datetimeFigureOut">
               <a:rPr lang="zh-TW" altLang="en-US" smtClean="0"/>
-              <a:t>2021/7/3</a:t>
+              <a:t>2021/7/5</a:t>
             </a:fld>
             <a:endParaRPr lang="zh-TW" altLang="en-US"/>
           </a:p>
@@ -1026,7 +1027,7 @@
           <a:p>
             <a:fld id="{177A7A6B-857B-42A0-831B-252DEB20B34E}" type="datetimeFigureOut">
               <a:rPr lang="zh-TW" altLang="en-US" smtClean="0"/>
-              <a:t>2021/7/3</a:t>
+              <a:t>2021/7/5</a:t>
             </a:fld>
             <a:endParaRPr lang="zh-TW" altLang="en-US"/>
           </a:p>
@@ -1258,7 +1259,7 @@
           <a:p>
             <a:fld id="{177A7A6B-857B-42A0-831B-252DEB20B34E}" type="datetimeFigureOut">
               <a:rPr lang="zh-TW" altLang="en-US" smtClean="0"/>
-              <a:t>2021/7/3</a:t>
+              <a:t>2021/7/5</a:t>
             </a:fld>
             <a:endParaRPr lang="zh-TW" altLang="en-US"/>
           </a:p>
@@ -1625,7 +1626,7 @@
           <a:p>
             <a:fld id="{177A7A6B-857B-42A0-831B-252DEB20B34E}" type="datetimeFigureOut">
               <a:rPr lang="zh-TW" altLang="en-US" smtClean="0"/>
-              <a:t>2021/7/3</a:t>
+              <a:t>2021/7/5</a:t>
             </a:fld>
             <a:endParaRPr lang="zh-TW" altLang="en-US"/>
           </a:p>
@@ -1743,7 +1744,7 @@
           <a:p>
             <a:fld id="{177A7A6B-857B-42A0-831B-252DEB20B34E}" type="datetimeFigureOut">
               <a:rPr lang="zh-TW" altLang="en-US" smtClean="0"/>
-              <a:t>2021/7/3</a:t>
+              <a:t>2021/7/5</a:t>
             </a:fld>
             <a:endParaRPr lang="zh-TW" altLang="en-US"/>
           </a:p>
@@ -1838,7 +1839,7 @@
           <a:p>
             <a:fld id="{177A7A6B-857B-42A0-831B-252DEB20B34E}" type="datetimeFigureOut">
               <a:rPr lang="zh-TW" altLang="en-US" smtClean="0"/>
-              <a:t>2021/7/3</a:t>
+              <a:t>2021/7/5</a:t>
             </a:fld>
             <a:endParaRPr lang="zh-TW" altLang="en-US"/>
           </a:p>
@@ -2115,7 +2116,7 @@
           <a:p>
             <a:fld id="{177A7A6B-857B-42A0-831B-252DEB20B34E}" type="datetimeFigureOut">
               <a:rPr lang="zh-TW" altLang="en-US" smtClean="0"/>
-              <a:t>2021/7/3</a:t>
+              <a:t>2021/7/5</a:t>
             </a:fld>
             <a:endParaRPr lang="zh-TW" altLang="en-US"/>
           </a:p>
@@ -2368,7 +2369,7 @@
           <a:p>
             <a:fld id="{177A7A6B-857B-42A0-831B-252DEB20B34E}" type="datetimeFigureOut">
               <a:rPr lang="zh-TW" altLang="en-US" smtClean="0"/>
-              <a:t>2021/7/3</a:t>
+              <a:t>2021/7/5</a:t>
             </a:fld>
             <a:endParaRPr lang="zh-TW" altLang="en-US"/>
           </a:p>
@@ -2581,7 +2582,7 @@
           <a:p>
             <a:fld id="{177A7A6B-857B-42A0-831B-252DEB20B34E}" type="datetimeFigureOut">
               <a:rPr lang="zh-TW" altLang="en-US" smtClean="0"/>
-              <a:t>2021/7/3</a:t>
+              <a:t>2021/7/5</a:t>
             </a:fld>
             <a:endParaRPr lang="zh-TW" altLang="en-US"/>
           </a:p>
@@ -6065,6 +6066,515 @@
 </p:sld>
 </file>
 
+<file path=ppt/slides/slide7.xml><?xml version="1.0" encoding="utf-8"?>
+<p:sld xmlns:a="http://schemas.openxmlformats.org/drawingml/2006/main" xmlns:r="http://schemas.openxmlformats.org/officeDocument/2006/relationships" xmlns:p="http://schemas.openxmlformats.org/presentationml/2006/main">
+  <p:cSld>
+    <p:spTree>
+      <p:nvGrpSpPr>
+        <p:cNvPr id="1" name=""/>
+        <p:cNvGrpSpPr/>
+        <p:nvPr/>
+      </p:nvGrpSpPr>
+      <p:grpSpPr>
+        <a:xfrm>
+          <a:off x="0" y="0"/>
+          <a:ext cx="0" cy="0"/>
+          <a:chOff x="0" y="0"/>
+          <a:chExt cx="0" cy="0"/>
+        </a:xfrm>
+      </p:grpSpPr>
+      <p:sp>
+        <p:nvSpPr>
+          <p:cNvPr id="4" name="圓角矩形 3"/>
+          <p:cNvSpPr/>
+          <p:nvPr/>
+        </p:nvSpPr>
+        <p:spPr>
+          <a:xfrm>
+            <a:off x="4950068" y="1714500"/>
+            <a:ext cx="2171700" cy="1081454"/>
+          </a:xfrm>
+          <a:prstGeom prst="roundRect">
+            <a:avLst/>
+          </a:prstGeom>
+        </p:spPr>
+        <p:style>
+          <a:lnRef idx="2">
+            <a:schemeClr val="accent1">
+              <a:shade val="50000"/>
+            </a:schemeClr>
+          </a:lnRef>
+          <a:fillRef idx="1">
+            <a:schemeClr val="accent1"/>
+          </a:fillRef>
+          <a:effectRef idx="0">
+            <a:schemeClr val="accent1"/>
+          </a:effectRef>
+          <a:fontRef idx="minor">
+            <a:schemeClr val="lt1"/>
+          </a:fontRef>
+        </p:style>
+        <p:txBody>
+          <a:bodyPr rtlCol="0" anchor="ctr"/>
+          <a:lstStyle/>
+          <a:p>
+            <a:pPr algn="ctr"/>
+            <a:r>
+              <a:rPr lang="en-US" altLang="zh-TW" dirty="0" smtClean="0"/>
+              <a:t>Interface{}</a:t>
+            </a:r>
+            <a:endParaRPr lang="zh-TW" altLang="en-US" dirty="0"/>
+          </a:p>
+        </p:txBody>
+      </p:sp>
+      <p:sp>
+        <p:nvSpPr>
+          <p:cNvPr id="5" name="圓角矩形 4"/>
+          <p:cNvSpPr/>
+          <p:nvPr/>
+        </p:nvSpPr>
+        <p:spPr>
+          <a:xfrm>
+            <a:off x="9410700" y="4012223"/>
+            <a:ext cx="2171700" cy="1081454"/>
+          </a:xfrm>
+          <a:prstGeom prst="roundRect">
+            <a:avLst/>
+          </a:prstGeom>
+        </p:spPr>
+        <p:style>
+          <a:lnRef idx="2">
+            <a:schemeClr val="accent1">
+              <a:shade val="50000"/>
+            </a:schemeClr>
+          </a:lnRef>
+          <a:fillRef idx="1">
+            <a:schemeClr val="accent1"/>
+          </a:fillRef>
+          <a:effectRef idx="0">
+            <a:schemeClr val="accent1"/>
+          </a:effectRef>
+          <a:fontRef idx="minor">
+            <a:schemeClr val="lt1"/>
+          </a:fontRef>
+        </p:style>
+        <p:txBody>
+          <a:bodyPr rtlCol="0" anchor="ctr"/>
+          <a:lstStyle/>
+          <a:p>
+            <a:pPr algn="ctr"/>
+            <a:r>
+              <a:rPr lang="en-US" altLang="zh-TW" dirty="0" err="1" smtClean="0"/>
+              <a:t>reflect.Value</a:t>
+            </a:r>
+            <a:endParaRPr lang="zh-TW" altLang="en-US" dirty="0"/>
+          </a:p>
+        </p:txBody>
+      </p:sp>
+      <p:sp>
+        <p:nvSpPr>
+          <p:cNvPr id="6" name="圓角矩形 5"/>
+          <p:cNvSpPr/>
+          <p:nvPr/>
+        </p:nvSpPr>
+        <p:spPr>
+          <a:xfrm>
+            <a:off x="577362" y="3856893"/>
+            <a:ext cx="2171700" cy="1081454"/>
+          </a:xfrm>
+          <a:prstGeom prst="roundRect">
+            <a:avLst/>
+          </a:prstGeom>
+        </p:spPr>
+        <p:style>
+          <a:lnRef idx="2">
+            <a:schemeClr val="accent1">
+              <a:shade val="50000"/>
+            </a:schemeClr>
+          </a:lnRef>
+          <a:fillRef idx="1">
+            <a:schemeClr val="accent1"/>
+          </a:fillRef>
+          <a:effectRef idx="0">
+            <a:schemeClr val="accent1"/>
+          </a:effectRef>
+          <a:fontRef idx="minor">
+            <a:schemeClr val="lt1"/>
+          </a:fontRef>
+        </p:style>
+        <p:txBody>
+          <a:bodyPr rtlCol="0" anchor="ctr"/>
+          <a:lstStyle/>
+          <a:p>
+            <a:pPr algn="ctr"/>
+            <a:r>
+              <a:rPr lang="en-US" altLang="zh-TW" dirty="0" smtClean="0"/>
+              <a:t>variable</a:t>
+            </a:r>
+            <a:endParaRPr lang="zh-TW" altLang="en-US" dirty="0"/>
+          </a:p>
+        </p:txBody>
+      </p:sp>
+      <p:cxnSp>
+        <p:nvCxnSpPr>
+          <p:cNvPr id="8" name="直線單箭頭接點 7"/>
+          <p:cNvCxnSpPr/>
+          <p:nvPr/>
+        </p:nvCxnSpPr>
+        <p:spPr>
+          <a:xfrm flipV="1">
+            <a:off x="1197220" y="2327030"/>
+            <a:ext cx="3656134" cy="1685193"/>
+          </a:xfrm>
+          <a:prstGeom prst="straightConnector1">
+            <a:avLst/>
+          </a:prstGeom>
+          <a:ln>
+            <a:tailEnd type="triangle"/>
+          </a:ln>
+        </p:spPr>
+        <p:style>
+          <a:lnRef idx="1">
+            <a:schemeClr val="accent1"/>
+          </a:lnRef>
+          <a:fillRef idx="0">
+            <a:schemeClr val="accent1"/>
+          </a:fillRef>
+          <a:effectRef idx="0">
+            <a:schemeClr val="accent1"/>
+          </a:effectRef>
+          <a:fontRef idx="minor">
+            <a:schemeClr val="tx1"/>
+          </a:fontRef>
+        </p:style>
+      </p:cxnSp>
+      <p:cxnSp>
+        <p:nvCxnSpPr>
+          <p:cNvPr id="10" name="直線單箭頭接點 9"/>
+          <p:cNvCxnSpPr/>
+          <p:nvPr/>
+        </p:nvCxnSpPr>
+        <p:spPr>
+          <a:xfrm>
+            <a:off x="7271238" y="2255227"/>
+            <a:ext cx="2866293" cy="1601666"/>
+          </a:xfrm>
+          <a:prstGeom prst="straightConnector1">
+            <a:avLst/>
+          </a:prstGeom>
+          <a:ln>
+            <a:tailEnd type="triangle"/>
+          </a:ln>
+        </p:spPr>
+        <p:style>
+          <a:lnRef idx="1">
+            <a:schemeClr val="accent1"/>
+          </a:lnRef>
+          <a:fillRef idx="0">
+            <a:schemeClr val="accent1"/>
+          </a:fillRef>
+          <a:effectRef idx="0">
+            <a:schemeClr val="accent1"/>
+          </a:effectRef>
+          <a:fontRef idx="minor">
+            <a:schemeClr val="tx1"/>
+          </a:fontRef>
+        </p:style>
+      </p:cxnSp>
+      <p:cxnSp>
+        <p:nvCxnSpPr>
+          <p:cNvPr id="12" name="直線單箭頭接點 11"/>
+          <p:cNvCxnSpPr>
+            <a:stCxn id="5" idx="1"/>
+          </p:cNvCxnSpPr>
+          <p:nvPr/>
+        </p:nvCxnSpPr>
+        <p:spPr>
+          <a:xfrm flipH="1" flipV="1">
+            <a:off x="6778869" y="2936631"/>
+            <a:ext cx="2631831" cy="1616319"/>
+          </a:xfrm>
+          <a:prstGeom prst="straightConnector1">
+            <a:avLst/>
+          </a:prstGeom>
+          <a:ln>
+            <a:tailEnd type="triangle"/>
+          </a:ln>
+        </p:spPr>
+        <p:style>
+          <a:lnRef idx="1">
+            <a:schemeClr val="accent1"/>
+          </a:lnRef>
+          <a:fillRef idx="0">
+            <a:schemeClr val="accent1"/>
+          </a:fillRef>
+          <a:effectRef idx="0">
+            <a:schemeClr val="accent1"/>
+          </a:effectRef>
+          <a:fontRef idx="minor">
+            <a:schemeClr val="tx1"/>
+          </a:fontRef>
+        </p:style>
+      </p:cxnSp>
+      <p:cxnSp>
+        <p:nvCxnSpPr>
+          <p:cNvPr id="14" name="直線單箭頭接點 13"/>
+          <p:cNvCxnSpPr/>
+          <p:nvPr/>
+        </p:nvCxnSpPr>
+        <p:spPr>
+          <a:xfrm flipH="1">
+            <a:off x="2898532" y="2951284"/>
+            <a:ext cx="2332891" cy="1189893"/>
+          </a:xfrm>
+          <a:prstGeom prst="straightConnector1">
+            <a:avLst/>
+          </a:prstGeom>
+          <a:ln>
+            <a:tailEnd type="triangle"/>
+          </a:ln>
+        </p:spPr>
+        <p:style>
+          <a:lnRef idx="1">
+            <a:schemeClr val="accent1"/>
+          </a:lnRef>
+          <a:fillRef idx="0">
+            <a:schemeClr val="accent1"/>
+          </a:fillRef>
+          <a:effectRef idx="0">
+            <a:schemeClr val="accent1"/>
+          </a:effectRef>
+          <a:fontRef idx="minor">
+            <a:schemeClr val="tx1"/>
+          </a:fontRef>
+        </p:style>
+      </p:cxnSp>
+      <p:sp>
+        <p:nvSpPr>
+          <p:cNvPr id="15" name="橢圓 14"/>
+          <p:cNvSpPr/>
+          <p:nvPr/>
+        </p:nvSpPr>
+        <p:spPr>
+          <a:xfrm>
+            <a:off x="2359271" y="2595195"/>
+            <a:ext cx="1603130" cy="712177"/>
+          </a:xfrm>
+          <a:prstGeom prst="ellipse">
+            <a:avLst/>
+          </a:prstGeom>
+        </p:spPr>
+        <p:style>
+          <a:lnRef idx="1">
+            <a:schemeClr val="accent2"/>
+          </a:lnRef>
+          <a:fillRef idx="2">
+            <a:schemeClr val="accent2"/>
+          </a:fillRef>
+          <a:effectRef idx="1">
+            <a:schemeClr val="accent2"/>
+          </a:effectRef>
+          <a:fontRef idx="minor">
+            <a:schemeClr val="dk1"/>
+          </a:fontRef>
+        </p:style>
+        <p:txBody>
+          <a:bodyPr rtlCol="0" anchor="ctr"/>
+          <a:lstStyle/>
+          <a:p>
+            <a:pPr algn="ctr"/>
+            <a:r>
+              <a:rPr lang="zh-TW" altLang="en-US" dirty="0"/>
+              <a:t>傳遞參數</a:t>
+            </a:r>
+          </a:p>
+        </p:txBody>
+      </p:sp>
+      <p:sp>
+        <p:nvSpPr>
+          <p:cNvPr id="18" name="橢圓 17"/>
+          <p:cNvSpPr/>
+          <p:nvPr/>
+        </p:nvSpPr>
+        <p:spPr>
+          <a:xfrm>
+            <a:off x="3494943" y="3364523"/>
+            <a:ext cx="1603130" cy="712177"/>
+          </a:xfrm>
+          <a:prstGeom prst="ellipse">
+            <a:avLst/>
+          </a:prstGeom>
+        </p:spPr>
+        <p:style>
+          <a:lnRef idx="1">
+            <a:schemeClr val="accent2"/>
+          </a:lnRef>
+          <a:fillRef idx="2">
+            <a:schemeClr val="accent2"/>
+          </a:fillRef>
+          <a:effectRef idx="1">
+            <a:schemeClr val="accent2"/>
+          </a:effectRef>
+          <a:fontRef idx="minor">
+            <a:schemeClr val="dk1"/>
+          </a:fontRef>
+        </p:style>
+        <p:txBody>
+          <a:bodyPr rtlCol="0" anchor="ctr"/>
+          <a:lstStyle/>
+          <a:p>
+            <a:pPr algn="ctr"/>
+            <a:r>
+              <a:rPr lang="en-US" altLang="zh-TW" dirty="0" smtClean="0"/>
+              <a:t>assert</a:t>
+            </a:r>
+            <a:endParaRPr lang="zh-TW" altLang="en-US" dirty="0"/>
+          </a:p>
+        </p:txBody>
+      </p:sp>
+      <p:sp>
+        <p:nvSpPr>
+          <p:cNvPr id="19" name="橢圓 18"/>
+          <p:cNvSpPr/>
+          <p:nvPr/>
+        </p:nvSpPr>
+        <p:spPr>
+          <a:xfrm>
+            <a:off x="6875588" y="3488349"/>
+            <a:ext cx="2042743" cy="712177"/>
+          </a:xfrm>
+          <a:prstGeom prst="ellipse">
+            <a:avLst/>
+          </a:prstGeom>
+        </p:spPr>
+        <p:style>
+          <a:lnRef idx="1">
+            <a:schemeClr val="accent2"/>
+          </a:lnRef>
+          <a:fillRef idx="2">
+            <a:schemeClr val="accent2"/>
+          </a:fillRef>
+          <a:effectRef idx="1">
+            <a:schemeClr val="accent2"/>
+          </a:effectRef>
+          <a:fontRef idx="minor">
+            <a:schemeClr val="dk1"/>
+          </a:fontRef>
+        </p:style>
+        <p:txBody>
+          <a:bodyPr rtlCol="0" anchor="ctr"/>
+          <a:lstStyle/>
+          <a:p>
+            <a:pPr algn="ctr"/>
+            <a:r>
+              <a:rPr lang="en-US" altLang="zh-TW" dirty="0" err="1" smtClean="0"/>
+              <a:t>v.Interface</a:t>
+            </a:r>
+            <a:endParaRPr lang="en-US" altLang="zh-TW" dirty="0" smtClean="0"/>
+          </a:p>
+          <a:p>
+            <a:pPr algn="ctr"/>
+            <a:r>
+              <a:rPr lang="en-US" altLang="zh-TW" dirty="0" smtClean="0"/>
+              <a:t>V: type -&gt; </a:t>
+            </a:r>
+            <a:r>
+              <a:rPr lang="en-US" altLang="zh-TW" dirty="0" err="1" smtClean="0"/>
+              <a:t>reflect.Value</a:t>
+            </a:r>
+            <a:endParaRPr lang="zh-TW" altLang="en-US" dirty="0"/>
+          </a:p>
+        </p:txBody>
+      </p:sp>
+      <p:sp>
+        <p:nvSpPr>
+          <p:cNvPr id="20" name="橢圓 19"/>
+          <p:cNvSpPr/>
+          <p:nvPr/>
+        </p:nvSpPr>
+        <p:spPr>
+          <a:xfrm>
+            <a:off x="7943853" y="2457449"/>
+            <a:ext cx="1959216" cy="712177"/>
+          </a:xfrm>
+          <a:prstGeom prst="ellipse">
+            <a:avLst/>
+          </a:prstGeom>
+        </p:spPr>
+        <p:style>
+          <a:lnRef idx="1">
+            <a:schemeClr val="accent2"/>
+          </a:lnRef>
+          <a:fillRef idx="2">
+            <a:schemeClr val="accent2"/>
+          </a:fillRef>
+          <a:effectRef idx="1">
+            <a:schemeClr val="accent2"/>
+          </a:effectRef>
+          <a:fontRef idx="minor">
+            <a:schemeClr val="dk1"/>
+          </a:fontRef>
+        </p:style>
+        <p:txBody>
+          <a:bodyPr rtlCol="0" anchor="ctr"/>
+          <a:lstStyle/>
+          <a:p>
+            <a:pPr algn="ctr"/>
+            <a:r>
+              <a:rPr lang="en-US" altLang="zh-TW" dirty="0" err="1" smtClean="0"/>
+              <a:t>reflect.Value</a:t>
+            </a:r>
+            <a:endParaRPr lang="zh-TW" altLang="en-US" dirty="0"/>
+          </a:p>
+        </p:txBody>
+      </p:sp>
+      <p:sp>
+        <p:nvSpPr>
+          <p:cNvPr id="21" name="文字方塊 20"/>
+          <p:cNvSpPr txBox="1"/>
+          <p:nvPr/>
+        </p:nvSpPr>
+        <p:spPr>
+          <a:xfrm>
+            <a:off x="5371368" y="631526"/>
+            <a:ext cx="3192340" cy="369332"/>
+          </a:xfrm>
+          <a:prstGeom prst="rect">
+            <a:avLst/>
+          </a:prstGeom>
+          <a:noFill/>
+        </p:spPr>
+        <p:txBody>
+          <a:bodyPr wrap="square" rtlCol="0">
+            <a:spAutoFit/>
+          </a:bodyPr>
+          <a:lstStyle/>
+          <a:p>
+            <a:r>
+              <a:rPr lang="en-US" altLang="zh-TW" dirty="0" smtClean="0"/>
+              <a:t>Reflect </a:t>
+            </a:r>
+            <a:r>
+              <a:rPr lang="zh-TW" altLang="en-US" dirty="0" smtClean="0"/>
+              <a:t>機制</a:t>
+            </a:r>
+            <a:endParaRPr lang="zh-TW" altLang="en-US" dirty="0"/>
+          </a:p>
+        </p:txBody>
+      </p:sp>
+    </p:spTree>
+    <p:extLst>
+      <p:ext uri="{BB962C8B-B14F-4D97-AF65-F5344CB8AC3E}">
+        <p14:creationId xmlns:p14="http://schemas.microsoft.com/office/powerpoint/2010/main" val="61123217"/>
+      </p:ext>
+    </p:extLst>
+  </p:cSld>
+  <p:clrMapOvr>
+    <a:masterClrMapping/>
+  </p:clrMapOvr>
+</p:sld>
+</file>
+
 <file path=ppt/theme/theme1.xml><?xml version="1.0" encoding="utf-8"?>
 <a:theme xmlns:a="http://schemas.openxmlformats.org/drawingml/2006/main" name="Office 佈景主題">
   <a:themeElements>

</xml_diff>